<commit_message>
Updated after first PG&E power outage...
</commit_message>
<xml_diff>
--- a/data8/slides/lab7.pptx
+++ b/data8/slides/lab7.pptx
@@ -9,19 +9,22 @@
     <p:sldMasterId id="2147483699" r:id="rId5"/>
   </p:sldMasterIdLst>
   <p:notesMasterIdLst>
-    <p:notesMasterId r:id="rId13"/>
+    <p:notesMasterId r:id="rId16"/>
   </p:notesMasterIdLst>
   <p:handoutMasterIdLst>
-    <p:handoutMasterId r:id="rId14"/>
+    <p:handoutMasterId r:id="rId17"/>
   </p:handoutMasterIdLst>
   <p:sldIdLst>
     <p:sldId id="256" r:id="rId6"/>
-    <p:sldId id="289" r:id="rId7"/>
-    <p:sldId id="287" r:id="rId8"/>
-    <p:sldId id="290" r:id="rId9"/>
-    <p:sldId id="291" r:id="rId10"/>
-    <p:sldId id="267" r:id="rId11"/>
-    <p:sldId id="266" r:id="rId12"/>
+    <p:sldId id="287" r:id="rId7"/>
+    <p:sldId id="292" r:id="rId8"/>
+    <p:sldId id="293" r:id="rId9"/>
+    <p:sldId id="295" r:id="rId10"/>
+    <p:sldId id="296" r:id="rId11"/>
+    <p:sldId id="298" r:id="rId12"/>
+    <p:sldId id="297" r:id="rId13"/>
+    <p:sldId id="267" r:id="rId14"/>
+    <p:sldId id="266" r:id="rId15"/>
   </p:sldIdLst>
   <p:sldSz cx="9144000" cy="6858000" type="screen4x3"/>
   <p:notesSz cx="6858000" cy="9144000"/>
@@ -205,7 +208,7 @@
           <a:p>
             <a:fld id="{97CB1905-1EEB-6545-B5E2-B70E8868255E}" type="datetimeFigureOut">
               <a:rPr lang="en-US" smtClean="0"/>
-              <a:t>9/2/2019</a:t>
+              <a:t>10/25/2019</a:t>
             </a:fld>
             <a:endParaRPr lang="en-US"/>
           </a:p>
@@ -371,7 +374,7 @@
           <a:p>
             <a:fld id="{5F53F6BF-7462-9046-A2B6-90C29244BD27}" type="datetimeFigureOut">
               <a:rPr lang="en-US" smtClean="0"/>
-              <a:t>9/2/2019</a:t>
+              <a:t>10/25/2019</a:t>
             </a:fld>
             <a:endParaRPr lang="en-US"/>
           </a:p>
@@ -638,6 +641,94 @@
     </a:lvl9pPr>
   </p:notesStyle>
 </p:notesMaster>
+</file>
+
+<file path=ppt/notesSlides/notesSlide1.xml><?xml version="1.0" encoding="utf-8"?>
+<p:notes xmlns:a="http://schemas.openxmlformats.org/drawingml/2006/main" xmlns:r="http://schemas.openxmlformats.org/officeDocument/2006/relationships" xmlns:p="http://schemas.openxmlformats.org/presentationml/2006/main">
+  <p:cSld>
+    <p:spTree>
+      <p:nvGrpSpPr>
+        <p:cNvPr id="1" name=""/>
+        <p:cNvGrpSpPr/>
+        <p:nvPr/>
+      </p:nvGrpSpPr>
+      <p:grpSpPr>
+        <a:xfrm>
+          <a:off x="0" y="0"/>
+          <a:ext cx="0" cy="0"/>
+          <a:chOff x="0" y="0"/>
+          <a:chExt cx="0" cy="0"/>
+        </a:xfrm>
+      </p:grpSpPr>
+      <p:sp>
+        <p:nvSpPr>
+          <p:cNvPr id="2" name="Slide Image Placeholder 1"/>
+          <p:cNvSpPr>
+            <a:spLocks noGrp="1" noRot="1" noChangeAspect="1"/>
+          </p:cNvSpPr>
+          <p:nvPr>
+            <p:ph type="sldImg"/>
+          </p:nvPr>
+        </p:nvSpPr>
+        <p:spPr/>
+      </p:sp>
+      <p:sp>
+        <p:nvSpPr>
+          <p:cNvPr id="3" name="Notes Placeholder 2"/>
+          <p:cNvSpPr>
+            <a:spLocks noGrp="1"/>
+          </p:cNvSpPr>
+          <p:nvPr>
+            <p:ph type="body" idx="1"/>
+          </p:nvPr>
+        </p:nvSpPr>
+        <p:spPr/>
+        <p:txBody>
+          <a:bodyPr/>
+          <a:lstStyle/>
+          <a:p>
+            <a:pPr marL="0" indent="0">
+              <a:buFontTx/>
+              <a:buNone/>
+            </a:pPr>
+            <a:endParaRPr lang="en-CA" dirty="0"/>
+          </a:p>
+        </p:txBody>
+      </p:sp>
+      <p:sp>
+        <p:nvSpPr>
+          <p:cNvPr id="4" name="Slide Number Placeholder 3"/>
+          <p:cNvSpPr>
+            <a:spLocks noGrp="1"/>
+          </p:cNvSpPr>
+          <p:nvPr>
+            <p:ph type="sldNum" sz="quarter" idx="10"/>
+          </p:nvPr>
+        </p:nvSpPr>
+        <p:spPr/>
+        <p:txBody>
+          <a:bodyPr/>
+          <a:lstStyle/>
+          <a:p>
+            <a:fld id="{84B7DBC5-2A13-CA47-B9EE-6017A92B6B18}" type="slidenum">
+              <a:rPr lang="en-US" smtClean="0"/>
+              <a:t>1</a:t>
+            </a:fld>
+            <a:endParaRPr lang="en-US"/>
+          </a:p>
+        </p:txBody>
+      </p:sp>
+    </p:spTree>
+    <p:extLst>
+      <p:ext uri="{BB962C8B-B14F-4D97-AF65-F5344CB8AC3E}">
+        <p14:creationId xmlns:p14="http://schemas.microsoft.com/office/powerpoint/2010/main" val="2862142059"/>
+      </p:ext>
+    </p:extLst>
+  </p:cSld>
+  <p:clrMapOvr>
+    <a:masterClrMapping/>
+  </p:clrMapOvr>
+</p:notes>
 </file>
 
 <file path=ppt/slideLayouts/slideLayout1.xml><?xml version="1.0" encoding="utf-8"?>
@@ -7655,16 +7746,7 @@
                 </a:solidFill>
                 <a:latin typeface="Avenir LT Std 45 Book" pitchFamily="34" charset="0"/>
               </a:rPr>
-              <a:t>Data 8, Lab </a:t>
-            </a:r>
-            <a:r>
-              <a:rPr lang="en-US" dirty="0" smtClean="0">
-                <a:solidFill>
-                  <a:srgbClr val="C28220"/>
-                </a:solidFill>
-                <a:latin typeface="Avenir LT Std 45 Book" pitchFamily="34" charset="0"/>
-              </a:rPr>
-              <a:t>7</a:t>
+              <a:t>Data 8, Lab 7</a:t>
             </a:r>
             <a:endParaRPr lang="en-US" dirty="0">
               <a:solidFill>
@@ -7701,11 +7783,8 @@
               <a:rPr lang="en-US" b="1" dirty="0" smtClean="0">
                 <a:latin typeface="Avenir LT Std 45 Book" pitchFamily="34" charset="0"/>
               </a:rPr>
-              <a:t>The Bootstrap and Confidence Intervals</a:t>
-            </a:r>
-            <a:endParaRPr lang="en-US" b="1" dirty="0" smtClean="0">
-              <a:latin typeface="Avenir LT Std 45 Book" pitchFamily="34" charset="0"/>
-            </a:endParaRPr>
+              <a:t>A/B Testing</a:t>
+            </a:r>
           </a:p>
           <a:p>
             <a:endParaRPr lang="en-US" b="1" dirty="0">
@@ -7738,19 +7817,7 @@
               <a:rPr lang="en-US" dirty="0" smtClean="0">
                 <a:latin typeface="Avenir LT Std 45 Book" pitchFamily="34" charset="0"/>
               </a:rPr>
-              <a:t>25</a:t>
-            </a:r>
-            <a:r>
-              <a:rPr lang="en-US" dirty="0" smtClean="0">
-                <a:latin typeface="Avenir LT Std 45 Book" pitchFamily="34" charset="0"/>
-              </a:rPr>
-              <a:t> </a:t>
-            </a:r>
-            <a:r>
-              <a:rPr lang="en-US" dirty="0" smtClean="0">
-                <a:latin typeface="Avenir LT Std 45 Book" pitchFamily="34" charset="0"/>
-              </a:rPr>
-              <a:t>October 2019</a:t>
+              <a:t>25 October 2019</a:t>
             </a:r>
             <a:endParaRPr lang="en-US" dirty="0">
               <a:latin typeface="Avenir LT Std 45 Book" pitchFamily="34" charset="0"/>
@@ -7762,6 +7829,107 @@
     <p:extLst>
       <p:ext uri="{BB962C8B-B14F-4D97-AF65-F5344CB8AC3E}">
         <p14:creationId xmlns:p14="http://schemas.microsoft.com/office/powerpoint/2010/main" val="1276399452"/>
+      </p:ext>
+    </p:extLst>
+  </p:cSld>
+  <p:clrMapOvr>
+    <a:masterClrMapping/>
+  </p:clrMapOvr>
+  <p:timing>
+    <p:tnLst>
+      <p:par>
+        <p:cTn id="1" dur="indefinite" restart="never" nodeType="tmRoot"/>
+      </p:par>
+    </p:tnLst>
+  </p:timing>
+</p:sld>
+</file>
+
+<file path=ppt/slides/slide10.xml><?xml version="1.0" encoding="utf-8"?>
+<p:sld xmlns:a="http://schemas.openxmlformats.org/drawingml/2006/main" xmlns:r="http://schemas.openxmlformats.org/officeDocument/2006/relationships" xmlns:p="http://schemas.openxmlformats.org/presentationml/2006/main">
+  <p:cSld>
+    <p:spTree>
+      <p:nvGrpSpPr>
+        <p:cNvPr id="1" name=""/>
+        <p:cNvGrpSpPr/>
+        <p:nvPr/>
+      </p:nvGrpSpPr>
+      <p:grpSpPr>
+        <a:xfrm>
+          <a:off x="0" y="0"/>
+          <a:ext cx="0" cy="0"/>
+          <a:chOff x="0" y="0"/>
+          <a:chExt cx="0" cy="0"/>
+        </a:xfrm>
+      </p:grpSpPr>
+      <p:sp>
+        <p:nvSpPr>
+          <p:cNvPr id="2" name="Title 1"/>
+          <p:cNvSpPr>
+            <a:spLocks noGrp="1"/>
+          </p:cNvSpPr>
+          <p:nvPr>
+            <p:ph type="title"/>
+          </p:nvPr>
+        </p:nvSpPr>
+        <p:spPr>
+          <a:xfrm>
+            <a:off x="457200" y="449932"/>
+            <a:ext cx="8286750" cy="1150353"/>
+          </a:xfrm>
+        </p:spPr>
+        <p:txBody>
+          <a:bodyPr/>
+          <a:lstStyle/>
+          <a:p>
+            <a:r>
+              <a:rPr lang="en-CA" dirty="0" smtClean="0">
+                <a:latin typeface="+mn-lt"/>
+              </a:rPr>
+              <a:t>Lab Notebook</a:t>
+            </a:r>
+            <a:endParaRPr lang="en-CA" dirty="0">
+              <a:latin typeface="+mn-lt"/>
+            </a:endParaRPr>
+          </a:p>
+        </p:txBody>
+      </p:sp>
+      <p:sp>
+        <p:nvSpPr>
+          <p:cNvPr id="3" name="Content Placeholder 2"/>
+          <p:cNvSpPr>
+            <a:spLocks noGrp="1"/>
+          </p:cNvSpPr>
+          <p:nvPr>
+            <p:ph idx="1"/>
+          </p:nvPr>
+        </p:nvSpPr>
+        <p:spPr>
+          <a:xfrm>
+            <a:off x="457200" y="1756947"/>
+            <a:ext cx="8286750" cy="3596103"/>
+          </a:xfrm>
+        </p:spPr>
+        <p:txBody>
+          <a:bodyPr/>
+          <a:lstStyle/>
+          <a:p>
+            <a:pPr marL="0" indent="0">
+              <a:buNone/>
+            </a:pPr>
+            <a:r>
+              <a:rPr lang="en-CA" smtClean="0">
+                <a:latin typeface="Avenir LT Std 45 Book" pitchFamily="34" charset="0"/>
+              </a:rPr>
+              <a:t>TBD</a:t>
+            </a:r>
+          </a:p>
+        </p:txBody>
+      </p:sp>
+    </p:spTree>
+    <p:extLst>
+      <p:ext uri="{BB962C8B-B14F-4D97-AF65-F5344CB8AC3E}">
+        <p14:creationId xmlns:p14="http://schemas.microsoft.com/office/powerpoint/2010/main" val="687167673"/>
       </p:ext>
     </p:extLst>
   </p:cSld>
@@ -7819,7 +7987,7 @@
               <a:rPr lang="en-CA" dirty="0" smtClean="0">
                 <a:latin typeface="+mn-lt"/>
               </a:rPr>
-              <a:t>Agenda</a:t>
+              <a:t>Why A/B Testing?</a:t>
             </a:r>
             <a:endParaRPr lang="en-CA" dirty="0">
               <a:latin typeface="+mn-lt"/>
@@ -7847,55 +8015,62 @@
           <a:bodyPr/>
           <a:lstStyle/>
           <a:p>
-            <a:pPr marL="457200" indent="-457200">
-              <a:buAutoNum type="arabicPeriod"/>
-            </a:pPr>
             <a:r>
               <a:rPr lang="en-CA" dirty="0" smtClean="0">
                 <a:latin typeface="+mn-lt"/>
               </a:rPr>
-              <a:t>The Bootstrap</a:t>
-            </a:r>
-            <a:endParaRPr lang="en-CA" dirty="0" smtClean="0">
-              <a:latin typeface="+mn-lt"/>
-            </a:endParaRPr>
-          </a:p>
-          <a:p>
-            <a:pPr marL="457200" indent="-457200">
-              <a:buAutoNum type="arabicPeriod"/>
-            </a:pPr>
+              <a:t>Used to test if two observed distributions (sets of values) are from the same underlying distribution</a:t>
+            </a:r>
+          </a:p>
+          <a:p>
             <a:r>
               <a:rPr lang="en-CA" dirty="0" smtClean="0">
                 <a:latin typeface="+mn-lt"/>
               </a:rPr>
-              <a:t>Confidence Intervals</a:t>
-            </a:r>
-            <a:endParaRPr lang="en-CA" dirty="0" smtClean="0">
-              <a:latin typeface="+mn-lt"/>
-            </a:endParaRPr>
-          </a:p>
-          <a:p>
-            <a:pPr marL="457200" indent="-457200">
-              <a:buAutoNum type="arabicPeriod"/>
-            </a:pPr>
-            <a:endParaRPr lang="en-CA" dirty="0" smtClean="0">
-              <a:latin typeface="+mn-lt"/>
-            </a:endParaRPr>
-          </a:p>
-          <a:p>
-            <a:pPr marL="457200" indent="-457200">
-              <a:buAutoNum type="arabicPeriod"/>
-            </a:pPr>
-            <a:endParaRPr lang="en-CA" dirty="0" smtClean="0">
-              <a:latin typeface="+mn-lt"/>
-            </a:endParaRPr>
+              <a:t>Example:</a:t>
+            </a:r>
+          </a:p>
+          <a:p>
+            <a:pPr lvl="1"/>
+            <a:r>
+              <a:rPr lang="en-CA" dirty="0" smtClean="0">
+                <a:latin typeface="+mn-lt"/>
+              </a:rPr>
+              <a:t>Distribution 1: Weights of babies of moms who smoke</a:t>
+            </a:r>
+          </a:p>
+          <a:p>
+            <a:pPr lvl="1"/>
+            <a:r>
+              <a:rPr lang="en-CA" dirty="0" smtClean="0">
+                <a:latin typeface="+mn-lt"/>
+              </a:rPr>
+              <a:t>Distribution 2: Weights of babies of moms who do not smoke</a:t>
+            </a:r>
+          </a:p>
+          <a:p>
+            <a:pPr lvl="1"/>
+            <a:r>
+              <a:rPr lang="en-CA" dirty="0" smtClean="0">
+                <a:latin typeface="+mn-lt"/>
+              </a:rPr>
+              <a:t>Question: Are these distributions from the same underlying distribution?</a:t>
+            </a:r>
+          </a:p>
+          <a:p>
+            <a:r>
+              <a:rPr lang="en-CA" dirty="0" smtClean="0">
+                <a:latin typeface="+mn-lt"/>
+              </a:rPr>
+              <a:t>An A/B test is an example of a permutation test!</a:t>
+            </a:r>
           </a:p>
         </p:txBody>
       </p:sp>
     </p:spTree>
     <p:extLst>
       <p:ext uri="{BB962C8B-B14F-4D97-AF65-F5344CB8AC3E}">
-        <p14:creationId xmlns:p14="http://schemas.microsoft.com/office/powerpoint/2010/main" val="1468042102"/>
+        <p14:creationId xmlns:p14="http://schemas.microsoft.com/office/powerpoint/2010/main" val="3385360168"/>
       </p:ext>
     </p:extLst>
   </p:cSld>
@@ -7953,7 +8128,7 @@
               <a:rPr lang="en-CA" dirty="0" smtClean="0">
                 <a:latin typeface="+mn-lt"/>
               </a:rPr>
-              <a:t>The Bootstrap</a:t>
+              <a:t>A/B Testing Hypothesis</a:t>
             </a:r>
             <a:endParaRPr lang="en-CA" dirty="0">
               <a:latin typeface="+mn-lt"/>
@@ -7978,58 +8153,116 @@
           </a:xfrm>
         </p:spPr>
         <p:txBody>
-          <a:bodyPr/>
+          <a:bodyPr>
+            <a:normAutofit/>
+          </a:bodyPr>
           <a:lstStyle/>
           <a:p>
+            <a:r>
+              <a:rPr lang="en-CA" b="1" dirty="0" smtClean="0">
+                <a:latin typeface="+mn-lt"/>
+              </a:rPr>
+              <a:t>Null Hypothesis: </a:t>
+            </a:r>
             <a:r>
               <a:rPr lang="en-CA" dirty="0" smtClean="0">
                 <a:latin typeface="+mn-lt"/>
               </a:rPr>
-              <a:t>If the original sample is large and selected at random, it likely resembles the population</a:t>
-            </a:r>
-          </a:p>
-          <a:p>
+              <a:t>The two distributions are from the same underlying distribution, and any differences are due to chance</a:t>
+            </a:r>
+          </a:p>
+          <a:p>
+            <a:pPr lvl="1"/>
             <a:r>
               <a:rPr lang="en-CA" dirty="0" smtClean="0">
                 <a:latin typeface="+mn-lt"/>
               </a:rPr>
-              <a:t>Instead of getting entirely new samples from the population, we resample from the origina</a:t>
+              <a:t>Example: The </a:t>
+            </a:r>
+            <a:r>
+              <a:rPr lang="en-CA" dirty="0">
+                <a:latin typeface="+mn-lt"/>
+              </a:rPr>
+              <a:t>distribution of birth weights of babies is the same for mothers who don't smoke as for mothers who do. The difference in the sample is due to chance</a:t>
             </a:r>
             <a:r>
               <a:rPr lang="en-CA" dirty="0" smtClean="0">
                 <a:latin typeface="+mn-lt"/>
               </a:rPr>
-              <a:t>l sample</a:t>
-            </a:r>
-          </a:p>
-          <a:p>
+              <a:t>.</a:t>
+            </a:r>
+          </a:p>
+          <a:p>
+            <a:r>
+              <a:rPr lang="en-CA" b="1" dirty="0" smtClean="0">
+                <a:latin typeface="+mn-lt"/>
+              </a:rPr>
+              <a:t>Alternative Hypothesis: </a:t>
+            </a:r>
             <a:r>
               <a:rPr lang="en-CA" dirty="0" smtClean="0">
                 <a:latin typeface="+mn-lt"/>
               </a:rPr>
-              <a:t>Resample same number of individuals </a:t>
+              <a:t>The two distributions are </a:t>
             </a:r>
             <a:r>
               <a:rPr lang="en-CA" b="1" dirty="0" smtClean="0">
                 <a:latin typeface="+mn-lt"/>
               </a:rPr>
-              <a:t>with replacement</a:t>
-            </a:r>
-            <a:endParaRPr lang="en-CA" dirty="0" smtClean="0">
-              <a:latin typeface="+mn-lt"/>
-            </a:endParaRPr>
-          </a:p>
-          <a:p>
-            <a:pPr lvl="1"/>
+              <a:t>not</a:t>
+            </a:r>
             <a:r>
               <a:rPr lang="en-CA" dirty="0" smtClean="0">
                 <a:latin typeface="+mn-lt"/>
               </a:rPr>
-              <a:t>If we sample without replacement, we will always get the sample original sample back!</a:t>
-            </a:r>
-          </a:p>
-          <a:p>
-            <a:endParaRPr lang="en-CA" dirty="0" smtClean="0">
+              <a:t> from the same underlying distribution, and any differences are </a:t>
+            </a:r>
+            <a:r>
+              <a:rPr lang="en-CA" b="1" dirty="0" smtClean="0">
+                <a:latin typeface="+mn-lt"/>
+              </a:rPr>
+              <a:t>not</a:t>
+            </a:r>
+            <a:r>
+              <a:rPr lang="en-CA" dirty="0" smtClean="0">
+                <a:latin typeface="+mn-lt"/>
+              </a:rPr>
+              <a:t> due to chance</a:t>
+            </a:r>
+          </a:p>
+          <a:p>
+            <a:pPr lvl="1"/>
+            <a:r>
+              <a:rPr lang="en-CA" dirty="0" smtClean="0">
+                <a:latin typeface="+mn-lt"/>
+              </a:rPr>
+              <a:t>Example</a:t>
+            </a:r>
+            <a:r>
+              <a:rPr lang="en-CA" dirty="0">
+                <a:latin typeface="+mn-lt"/>
+              </a:rPr>
+              <a:t>: </a:t>
+            </a:r>
+            <a:r>
+              <a:rPr lang="en-CA" dirty="0" smtClean="0">
+                <a:latin typeface="+mn-lt"/>
+              </a:rPr>
+              <a:t>The babies </a:t>
+            </a:r>
+            <a:r>
+              <a:rPr lang="en-CA" dirty="0">
+                <a:latin typeface="+mn-lt"/>
+              </a:rPr>
+              <a:t>of the mothers who smoke have a lower birth weight, on average, than the babies of the </a:t>
+            </a:r>
+            <a:r>
+              <a:rPr lang="en-CA" dirty="0" smtClean="0">
+                <a:latin typeface="+mn-lt"/>
+              </a:rPr>
+              <a:t>non-smokers</a:t>
+            </a:r>
+            <a:endParaRPr lang="en-CA" dirty="0">
               <a:latin typeface="+mn-lt"/>
             </a:endParaRPr>
           </a:p>
@@ -8038,7 +8271,7 @@
     </p:spTree>
     <p:extLst>
       <p:ext uri="{BB962C8B-B14F-4D97-AF65-F5344CB8AC3E}">
-        <p14:creationId xmlns:p14="http://schemas.microsoft.com/office/powerpoint/2010/main" val="3385360168"/>
+        <p14:creationId xmlns:p14="http://schemas.microsoft.com/office/powerpoint/2010/main" val="1429835681"/>
       </p:ext>
     </p:extLst>
   </p:cSld>
@@ -8096,7 +8329,7 @@
               <a:rPr lang="en-CA" dirty="0" smtClean="0">
                 <a:latin typeface="+mn-lt"/>
               </a:rPr>
-              <a:t>Confidence Interval</a:t>
+              <a:t>A/B Test Statistic</a:t>
             </a:r>
             <a:endParaRPr lang="en-CA" dirty="0">
               <a:latin typeface="+mn-lt"/>
@@ -8117,7 +8350,7 @@
         <p:spPr>
           <a:xfrm>
             <a:off x="457200" y="1756947"/>
-            <a:ext cx="8286750" cy="4043778"/>
+            <a:ext cx="8286750" cy="3596103"/>
           </a:xfrm>
         </p:spPr>
         <p:txBody>
@@ -8130,46 +8363,78 @@
               <a:rPr lang="en-CA" dirty="0" smtClean="0">
                 <a:latin typeface="+mn-lt"/>
               </a:rPr>
-              <a:t>Interval of estimates of a population parameter</a:t>
-            </a:r>
-          </a:p>
-          <a:p>
+              <a:t>Main Idea</a:t>
+            </a:r>
+            <a:r>
+              <a:rPr lang="en-CA" dirty="0">
+                <a:latin typeface="+mn-lt"/>
+              </a:rPr>
+              <a:t>: </a:t>
+            </a:r>
             <a:r>
               <a:rPr lang="en-CA" dirty="0" smtClean="0">
                 <a:latin typeface="+mn-lt"/>
               </a:rPr>
-              <a:t>A 95% confidence interval means i</a:t>
+              <a:t>Get two </a:t>
+            </a:r>
+            <a:r>
+              <a:rPr lang="en-CA" dirty="0">
+                <a:latin typeface="+mn-lt"/>
+              </a:rPr>
+              <a:t>representations of two </a:t>
             </a:r>
             <a:r>
               <a:rPr lang="en-CA" dirty="0" smtClean="0">
                 <a:latin typeface="+mn-lt"/>
               </a:rPr>
-              <a:t>f we create 100 confidence intervals from different samples, we expect 95 of them to contain the true population parameter</a:t>
-            </a:r>
-          </a:p>
-          <a:p>
+              <a:t>distributions </a:t>
+            </a:r>
+            <a:r>
+              <a:rPr lang="en-CA" dirty="0">
+                <a:latin typeface="+mn-lt"/>
+              </a:rPr>
+              <a:t>and </a:t>
+            </a:r>
             <a:r>
               <a:rPr lang="en-CA" dirty="0" smtClean="0">
                 <a:latin typeface="+mn-lt"/>
               </a:rPr>
-              <a:t>It does NOT mean that there is a 95% probability the true population parameter is in a confidence interval!!</a:t>
-            </a:r>
-          </a:p>
-          <a:p>
-            <a:pPr lvl="1"/>
+              <a:t>find </a:t>
+            </a:r>
+            <a:r>
+              <a:rPr lang="en-CA" dirty="0">
+                <a:latin typeface="+mn-lt"/>
+              </a:rPr>
+              <a:t>the difference between them</a:t>
+            </a:r>
+          </a:p>
+          <a:p>
             <a:r>
               <a:rPr lang="en-CA" dirty="0" smtClean="0">
                 <a:latin typeface="+mn-lt"/>
               </a:rPr>
-              <a:t>The population parameter is a constant. Once an interval is created, it either has the parameter or not</a:t>
-            </a:r>
-            <a:endParaRPr lang="en-CA" dirty="0" smtClean="0">
-              <a:latin typeface="+mn-lt"/>
-            </a:endParaRPr>
+              <a:t>Example:</a:t>
+            </a:r>
           </a:p>
           <a:p>
             <a:pPr lvl="1"/>
-            <a:endParaRPr lang="en-CA" dirty="0" smtClean="0">
+            <a:r>
+              <a:rPr lang="en-CA" dirty="0" smtClean="0">
+                <a:latin typeface="+mn-lt"/>
+              </a:rPr>
+              <a:t>Difference between the average weights of smoking and non-smoking babies</a:t>
+            </a:r>
+          </a:p>
+          <a:p>
+            <a:r>
+              <a:rPr lang="en-CA" dirty="0">
+                <a:latin typeface="+mn-lt"/>
+              </a:rPr>
+              <a:t>Under the null hypothesis, there should be no difference between the two distributions</a:t>
+            </a:r>
+          </a:p>
+          <a:p>
+            <a:endParaRPr lang="en-CA" dirty="0">
               <a:latin typeface="+mn-lt"/>
             </a:endParaRPr>
           </a:p>
@@ -8178,7 +8443,7 @@
     </p:spTree>
     <p:extLst>
       <p:ext uri="{BB962C8B-B14F-4D97-AF65-F5344CB8AC3E}">
-        <p14:creationId xmlns:p14="http://schemas.microsoft.com/office/powerpoint/2010/main" val="2381211813"/>
+        <p14:creationId xmlns:p14="http://schemas.microsoft.com/office/powerpoint/2010/main" val="2984441787"/>
       </p:ext>
     </p:extLst>
   </p:cSld>
@@ -8236,7 +8501,7 @@
               <a:rPr lang="en-CA" dirty="0" smtClean="0">
                 <a:latin typeface="+mn-lt"/>
               </a:rPr>
-              <a:t>Confidence Interval</a:t>
+              <a:t>A/B Testing: Shuffle Labels</a:t>
             </a:r>
             <a:endParaRPr lang="en-CA" dirty="0">
               <a:latin typeface="+mn-lt"/>
@@ -8257,7 +8522,7 @@
         <p:spPr>
           <a:xfrm>
             <a:off x="457200" y="1756947"/>
-            <a:ext cx="8286750" cy="4043778"/>
+            <a:ext cx="8286750" cy="3596103"/>
           </a:xfrm>
         </p:spPr>
         <p:txBody>
@@ -8266,8 +8531,25 @@
           </a:bodyPr>
           <a:lstStyle/>
           <a:p>
-            <a:pPr lvl="1"/>
-            <a:endParaRPr lang="en-CA" dirty="0" smtClean="0">
+            <a:r>
+              <a:rPr lang="en-CA" dirty="0" smtClean="0">
+                <a:latin typeface="+mn-lt"/>
+              </a:rPr>
+              <a:t>Shuffle the </a:t>
+            </a:r>
+            <a:r>
+              <a:rPr lang="en-CA" b="1" dirty="0" smtClean="0">
+                <a:latin typeface="+mn-lt"/>
+              </a:rPr>
+              <a:t>labels</a:t>
+            </a:r>
+            <a:r>
+              <a:rPr lang="en-CA" dirty="0" smtClean="0">
+                <a:latin typeface="+mn-lt"/>
+              </a:rPr>
+              <a:t> of the table: if the data are from the same distributions, rearranging the labels won’t matter!</a:t>
+            </a:r>
+            <a:endParaRPr lang="en-CA" dirty="0">
               <a:latin typeface="+mn-lt"/>
             </a:endParaRPr>
           </a:p>
@@ -8275,7 +8557,7 @@
       </p:sp>
       <p:pic>
         <p:nvPicPr>
-          <p:cNvPr id="7170" name="Picture 2" descr="https://lh4.googleusercontent.com/X7Y9Da4Q7WePdoFMwI6wzbVeqNuTHkHX3bJZF7PRs5r1nxA3L5GPE9TS7APKs2fOouSQ3fkH3RuaZ-q3Fw9LA49UZNZQZKPdf4VkkpnAsnshWItU4YAy0-Y8TR4kUwFr0yOWpIyfcv4"/>
+          <p:cNvPr id="1026" name="Picture 2"/>
           <p:cNvPicPr>
             <a:picLocks noChangeAspect="1" noChangeArrowheads="1"/>
           </p:cNvPicPr>
@@ -8296,28 +8578,148 @@
         </p:blipFill>
         <p:spPr bwMode="auto">
           <a:xfrm>
-            <a:off x="2228614" y="1478047"/>
-            <a:ext cx="4686773" cy="4322678"/>
+            <a:off x="1709466" y="2628899"/>
+            <a:ext cx="2133642" cy="3020217"/>
           </a:xfrm>
           <a:prstGeom prst="rect">
             <a:avLst/>
           </a:prstGeom>
           <a:noFill/>
+          <a:ln>
+            <a:noFill/>
+          </a:ln>
+          <a:effectLst/>
           <a:extLst>
             <a:ext uri="{909E8E84-426E-40DD-AFC4-6F175D3DCCD1}">
               <a14:hiddenFill xmlns:a14="http://schemas.microsoft.com/office/drawing/2010/main">
                 <a:solidFill>
-                  <a:srgbClr val="FFFFFF"/>
+                  <a:schemeClr val="accent1"/>
                 </a:solidFill>
               </a14:hiddenFill>
             </a:ext>
+            <a:ext uri="{91240B29-F687-4F45-9708-019B960494DF}">
+              <a14:hiddenLine xmlns:a14="http://schemas.microsoft.com/office/drawing/2010/main" w="9525">
+                <a:solidFill>
+                  <a:schemeClr val="tx1"/>
+                </a:solidFill>
+                <a:miter lim="800000"/>
+                <a:headEnd/>
+                <a:tailEnd/>
+              </a14:hiddenLine>
+            </a:ext>
+            <a:ext uri="{AF507438-7753-43E0-B8FC-AC1667EBCBE1}">
+              <a14:hiddenEffects xmlns:a14="http://schemas.microsoft.com/office/drawing/2010/main">
+                <a:effectLst>
+                  <a:outerShdw dist="35921" dir="2700000" algn="ctr" rotWithShape="0">
+                    <a:schemeClr val="bg2"/>
+                  </a:outerShdw>
+                </a:effectLst>
+              </a14:hiddenEffects>
+            </a:ext>
           </a:extLst>
         </p:spPr>
       </p:pic>
+      <p:pic>
+        <p:nvPicPr>
+          <p:cNvPr id="1027" name="Picture 3"/>
+          <p:cNvPicPr>
+            <a:picLocks noChangeAspect="1" noChangeArrowheads="1"/>
+          </p:cNvPicPr>
+          <p:nvPr/>
+        </p:nvPicPr>
+        <p:blipFill>
+          <a:blip r:embed="rId3">
+            <a:extLst>
+              <a:ext uri="{28A0092B-C50C-407E-A947-70E740481C1C}">
+                <a14:useLocalDpi xmlns:a14="http://schemas.microsoft.com/office/drawing/2010/main" val="0"/>
+              </a:ext>
+            </a:extLst>
+          </a:blip>
+          <a:srcRect/>
+          <a:stretch>
+            <a:fillRect/>
+          </a:stretch>
+        </p:blipFill>
+        <p:spPr bwMode="auto">
+          <a:xfrm>
+            <a:off x="5765239" y="2628899"/>
+            <a:ext cx="1027669" cy="3020218"/>
+          </a:xfrm>
+          <a:prstGeom prst="rect">
+            <a:avLst/>
+          </a:prstGeom>
+          <a:noFill/>
+          <a:ln>
+            <a:noFill/>
+          </a:ln>
+          <a:effectLst/>
+          <a:extLst>
+            <a:ext uri="{909E8E84-426E-40DD-AFC4-6F175D3DCCD1}">
+              <a14:hiddenFill xmlns:a14="http://schemas.microsoft.com/office/drawing/2010/main">
+                <a:solidFill>
+                  <a:schemeClr val="accent1"/>
+                </a:solidFill>
+              </a14:hiddenFill>
+            </a:ext>
+            <a:ext uri="{91240B29-F687-4F45-9708-019B960494DF}">
+              <a14:hiddenLine xmlns:a14="http://schemas.microsoft.com/office/drawing/2010/main" w="9525">
+                <a:solidFill>
+                  <a:schemeClr val="tx1"/>
+                </a:solidFill>
+                <a:miter lim="800000"/>
+                <a:headEnd/>
+                <a:tailEnd/>
+              </a14:hiddenLine>
+            </a:ext>
+            <a:ext uri="{AF507438-7753-43E0-B8FC-AC1667EBCBE1}">
+              <a14:hiddenEffects xmlns:a14="http://schemas.microsoft.com/office/drawing/2010/main">
+                <a:effectLst>
+                  <a:outerShdw dist="35921" dir="2700000" algn="ctr" rotWithShape="0">
+                    <a:schemeClr val="bg2"/>
+                  </a:outerShdw>
+                </a:effectLst>
+              </a14:hiddenEffects>
+            </a:ext>
+          </a:extLst>
+        </p:spPr>
+      </p:pic>
+      <p:cxnSp>
+        <p:nvCxnSpPr>
+          <p:cNvPr id="5" name="Straight Arrow Connector 4"/>
+          <p:cNvCxnSpPr/>
+          <p:nvPr/>
+        </p:nvCxnSpPr>
+        <p:spPr>
+          <a:xfrm>
+            <a:off x="4124325" y="3969542"/>
+            <a:ext cx="1304925" cy="0"/>
+          </a:xfrm>
+          <a:prstGeom prst="straightConnector1">
+            <a:avLst/>
+          </a:prstGeom>
+          <a:ln>
+            <a:tailEnd type="arrow"/>
+          </a:ln>
+        </p:spPr>
+        <p:style>
+          <a:lnRef idx="2">
+            <a:schemeClr val="accent1"/>
+          </a:lnRef>
+          <a:fillRef idx="0">
+            <a:schemeClr val="accent1"/>
+          </a:fillRef>
+          <a:effectRef idx="1">
+            <a:schemeClr val="accent1"/>
+          </a:effectRef>
+          <a:fontRef idx="minor">
+            <a:schemeClr val="tx1"/>
+          </a:fontRef>
+        </p:style>
+      </p:cxnSp>
     </p:spTree>
     <p:extLst>
       <p:ext uri="{BB962C8B-B14F-4D97-AF65-F5344CB8AC3E}">
-        <p14:creationId xmlns:p14="http://schemas.microsoft.com/office/powerpoint/2010/main" val="2494202213"/>
+        <p14:creationId xmlns:p14="http://schemas.microsoft.com/office/powerpoint/2010/main" val="2353883409"/>
       </p:ext>
     </p:extLst>
   </p:cSld>
@@ -8368,14 +8770,16 @@
           </a:xfrm>
         </p:spPr>
         <p:txBody>
-          <a:bodyPr/>
+          <a:bodyPr>
+            <a:normAutofit fontScale="90000"/>
+          </a:bodyPr>
           <a:lstStyle/>
           <a:p>
             <a:r>
               <a:rPr lang="en-CA" dirty="0" smtClean="0">
                 <a:latin typeface="+mn-lt"/>
               </a:rPr>
-              <a:t>Announcements</a:t>
+              <a:t>A/B Testing: Shuffle Labels (Cont’d)</a:t>
             </a:r>
             <a:endParaRPr lang="en-CA" dirty="0">
               <a:latin typeface="+mn-lt"/>
@@ -8396,23 +8800,116 @@
         <p:spPr>
           <a:xfrm>
             <a:off x="457200" y="1756947"/>
-            <a:ext cx="8286750" cy="3596103"/>
+            <a:ext cx="8286750" cy="3900903"/>
           </a:xfrm>
         </p:spPr>
         <p:txBody>
-          <a:bodyPr/>
+          <a:bodyPr>
+            <a:normAutofit/>
+          </a:bodyPr>
           <a:lstStyle/>
           <a:p>
-            <a:endParaRPr lang="en-CA" dirty="0">
-              <a:latin typeface="+mn-lt"/>
-            </a:endParaRPr>
+            <a:r>
+              <a:rPr lang="en-CA" dirty="0" smtClean="0">
+                <a:latin typeface="+mn-lt"/>
+              </a:rPr>
+              <a:t>How do we shuffle?</a:t>
+            </a:r>
+          </a:p>
+          <a:p>
+            <a:pPr lvl="1"/>
+            <a:r>
+              <a:rPr lang="en-CA" dirty="0" smtClean="0">
+                <a:latin typeface="+mn-lt"/>
+              </a:rPr>
+              <a:t>Sample the original labels of the table </a:t>
+            </a:r>
+            <a:r>
+              <a:rPr lang="en-CA" b="1" dirty="0" smtClean="0">
+                <a:latin typeface="+mn-lt"/>
+              </a:rPr>
+              <a:t>without replacement</a:t>
+            </a:r>
+            <a:r>
+              <a:rPr lang="en-CA" dirty="0" smtClean="0">
+                <a:latin typeface="+mn-lt"/>
+              </a:rPr>
+              <a:t> </a:t>
+            </a:r>
+          </a:p>
+          <a:p>
+            <a:pPr lvl="1"/>
+            <a:r>
+              <a:rPr lang="en-CA" dirty="0" smtClean="0">
+                <a:latin typeface="+mn-lt"/>
+              </a:rPr>
+              <a:t>Example: If the table has 500 rows, sample 500 labels without replacement</a:t>
+            </a:r>
+          </a:p>
+          <a:p>
+            <a:r>
+              <a:rPr lang="en-CA" dirty="0" smtClean="0">
+                <a:latin typeface="+mn-lt"/>
+              </a:rPr>
+              <a:t>Why without replacement?</a:t>
+            </a:r>
+          </a:p>
+          <a:p>
+            <a:pPr lvl="1"/>
+            <a:r>
+              <a:rPr lang="en-CA" dirty="0" smtClean="0">
+                <a:latin typeface="+mn-lt"/>
+              </a:rPr>
+              <a:t>This is so we keep the same proportions of labels each time! </a:t>
+            </a:r>
+          </a:p>
+          <a:p>
+            <a:r>
+              <a:rPr lang="en-CA" dirty="0" smtClean="0">
+                <a:latin typeface="+mn-lt"/>
+              </a:rPr>
+              <a:t>Command: </a:t>
+            </a:r>
+            <a:r>
+              <a:rPr lang="en-CA" dirty="0" err="1" smtClean="0">
+                <a:latin typeface="+mn-lt"/>
+              </a:rPr>
+              <a:t>tbl.sample</a:t>
+            </a:r>
+            <a:r>
+              <a:rPr lang="en-CA" dirty="0" smtClean="0">
+                <a:latin typeface="+mn-lt"/>
+              </a:rPr>
+              <a:t>(n, </a:t>
+            </a:r>
+            <a:r>
+              <a:rPr lang="en-CA" dirty="0" err="1" smtClean="0">
+                <a:latin typeface="+mn-lt"/>
+              </a:rPr>
+              <a:t>with_replacement</a:t>
+            </a:r>
+            <a:r>
+              <a:rPr lang="en-CA" dirty="0" smtClean="0">
+                <a:latin typeface="+mn-lt"/>
+              </a:rPr>
+              <a:t> = False)</a:t>
+            </a:r>
+          </a:p>
+          <a:p>
+            <a:pPr lvl="1"/>
+            <a:r>
+              <a:rPr lang="en-CA" dirty="0" smtClean="0">
+                <a:latin typeface="+mn-lt"/>
+              </a:rPr>
+              <a:t>Need to specify without replacement!! With replacement is True by default</a:t>
+            </a:r>
           </a:p>
         </p:txBody>
       </p:sp>
     </p:spTree>
     <p:extLst>
       <p:ext uri="{BB962C8B-B14F-4D97-AF65-F5344CB8AC3E}">
-        <p14:creationId xmlns:p14="http://schemas.microsoft.com/office/powerpoint/2010/main" val="203414778"/>
+        <p14:creationId xmlns:p14="http://schemas.microsoft.com/office/powerpoint/2010/main" val="940325909"/>
       </p:ext>
     </p:extLst>
   </p:cSld>
@@ -8463,14 +8960,16 @@
           </a:xfrm>
         </p:spPr>
         <p:txBody>
-          <a:bodyPr/>
+          <a:bodyPr>
+            <a:normAutofit/>
+          </a:bodyPr>
           <a:lstStyle/>
           <a:p>
             <a:r>
               <a:rPr lang="en-CA" dirty="0" smtClean="0">
                 <a:latin typeface="+mn-lt"/>
               </a:rPr>
-              <a:t>Lab Notebook</a:t>
+              <a:t>A/B Testing: Conclusions</a:t>
             </a:r>
             <a:endParaRPr lang="en-CA" dirty="0">
               <a:latin typeface="+mn-lt"/>
@@ -8491,21 +8990,74 @@
         <p:spPr>
           <a:xfrm>
             <a:off x="457200" y="1756947"/>
-            <a:ext cx="8286750" cy="3596103"/>
+            <a:ext cx="8286750" cy="3900903"/>
           </a:xfrm>
         </p:spPr>
         <p:txBody>
-          <a:bodyPr/>
+          <a:bodyPr>
+            <a:normAutofit/>
+          </a:bodyPr>
           <a:lstStyle/>
           <a:p>
-            <a:pPr marL="0" indent="0">
-              <a:buNone/>
-            </a:pPr>
-            <a:r>
-              <a:rPr lang="en-CA" smtClean="0">
-                <a:latin typeface="Avenir LT Std 45 Book" pitchFamily="34" charset="0"/>
+            <a:r>
+              <a:rPr lang="en-CA" dirty="0" smtClean="0">
+                <a:latin typeface="+mn-lt"/>
               </a:rPr>
-              <a:t>TBD</a:t>
+              <a:t>The rest of the procedure is similar to other hypothesis tests</a:t>
+            </a:r>
+          </a:p>
+          <a:p>
+            <a:r>
+              <a:rPr lang="en-CA" dirty="0" smtClean="0">
+                <a:latin typeface="+mn-lt"/>
+              </a:rPr>
+              <a:t>For a large number of iterations:</a:t>
+            </a:r>
+          </a:p>
+          <a:p>
+            <a:pPr lvl="1"/>
+            <a:r>
+              <a:rPr lang="en-CA" dirty="0" smtClean="0">
+                <a:latin typeface="+mn-lt"/>
+              </a:rPr>
+              <a:t>Shuffle the labels of the data (assuming the null is true)</a:t>
+            </a:r>
+          </a:p>
+          <a:p>
+            <a:pPr lvl="1"/>
+            <a:r>
+              <a:rPr lang="en-CA" dirty="0" smtClean="0">
+                <a:latin typeface="+mn-lt"/>
+              </a:rPr>
+              <a:t>Get the test statistic from the shuffled data</a:t>
+            </a:r>
+          </a:p>
+          <a:p>
+            <a:pPr lvl="1"/>
+            <a:r>
+              <a:rPr lang="en-CA" dirty="0" smtClean="0">
+                <a:latin typeface="+mn-lt"/>
+              </a:rPr>
+              <a:t>Store the test statistic </a:t>
+            </a:r>
+          </a:p>
+          <a:p>
+            <a:r>
+              <a:rPr lang="en-CA" dirty="0" smtClean="0">
+                <a:latin typeface="+mn-lt"/>
+              </a:rPr>
+              <a:t>Compare the observed test statistic with all the simulated test statistic</a:t>
+            </a:r>
+            <a:endParaRPr lang="en-CA" dirty="0">
+              <a:latin typeface="+mn-lt"/>
+            </a:endParaRPr>
+          </a:p>
+          <a:p>
+            <a:r>
+              <a:rPr lang="en-CA" dirty="0" smtClean="0">
+                <a:latin typeface="+mn-lt"/>
+              </a:rPr>
+              <a:t>P-value is the proportion of simulated test statistics equal to the observed test statistic or further in the direction of the alternative, assuming the null hypothesis is true</a:t>
             </a:r>
           </a:p>
         </p:txBody>
@@ -8513,7 +9065,332 @@
     </p:spTree>
     <p:extLst>
       <p:ext uri="{BB962C8B-B14F-4D97-AF65-F5344CB8AC3E}">
-        <p14:creationId xmlns:p14="http://schemas.microsoft.com/office/powerpoint/2010/main" val="687167673"/>
+        <p14:creationId xmlns:p14="http://schemas.microsoft.com/office/powerpoint/2010/main" val="3205280377"/>
+      </p:ext>
+    </p:extLst>
+  </p:cSld>
+  <p:clrMapOvr>
+    <a:masterClrMapping/>
+  </p:clrMapOvr>
+  <p:timing>
+    <p:tnLst>
+      <p:par>
+        <p:cTn id="1" dur="indefinite" restart="never" nodeType="tmRoot"/>
+      </p:par>
+    </p:tnLst>
+  </p:timing>
+</p:sld>
+</file>
+
+<file path=ppt/slides/slide8.xml><?xml version="1.0" encoding="utf-8"?>
+<p:sld xmlns:a="http://schemas.openxmlformats.org/drawingml/2006/main" xmlns:r="http://schemas.openxmlformats.org/officeDocument/2006/relationships" xmlns:p="http://schemas.openxmlformats.org/presentationml/2006/main">
+  <p:cSld>
+    <p:spTree>
+      <p:nvGrpSpPr>
+        <p:cNvPr id="1" name=""/>
+        <p:cNvGrpSpPr/>
+        <p:nvPr/>
+      </p:nvGrpSpPr>
+      <p:grpSpPr>
+        <a:xfrm>
+          <a:off x="0" y="0"/>
+          <a:ext cx="0" cy="0"/>
+          <a:chOff x="0" y="0"/>
+          <a:chExt cx="0" cy="0"/>
+        </a:xfrm>
+      </p:grpSpPr>
+      <p:sp>
+        <p:nvSpPr>
+          <p:cNvPr id="2" name="Title 1"/>
+          <p:cNvSpPr>
+            <a:spLocks noGrp="1"/>
+          </p:cNvSpPr>
+          <p:nvPr>
+            <p:ph type="title"/>
+          </p:nvPr>
+        </p:nvSpPr>
+        <p:spPr>
+          <a:xfrm>
+            <a:off x="457200" y="449932"/>
+            <a:ext cx="8286750" cy="1150353"/>
+          </a:xfrm>
+        </p:spPr>
+        <p:txBody>
+          <a:bodyPr/>
+          <a:lstStyle/>
+          <a:p>
+            <a:r>
+              <a:rPr lang="en-CA" dirty="0" smtClean="0">
+                <a:latin typeface="+mn-lt"/>
+              </a:rPr>
+              <a:t>A/B Testing vs. TVD</a:t>
+            </a:r>
+            <a:endParaRPr lang="en-CA" dirty="0">
+              <a:latin typeface="+mn-lt"/>
+            </a:endParaRPr>
+          </a:p>
+        </p:txBody>
+      </p:sp>
+      <p:sp>
+        <p:nvSpPr>
+          <p:cNvPr id="3" name="Content Placeholder 2"/>
+          <p:cNvSpPr>
+            <a:spLocks noGrp="1"/>
+          </p:cNvSpPr>
+          <p:nvPr>
+            <p:ph idx="1"/>
+          </p:nvPr>
+        </p:nvSpPr>
+        <p:spPr>
+          <a:xfrm>
+            <a:off x="457200" y="1756947"/>
+            <a:ext cx="8286750" cy="3900903"/>
+          </a:xfrm>
+        </p:spPr>
+        <p:txBody>
+          <a:bodyPr>
+            <a:normAutofit/>
+          </a:bodyPr>
+          <a:lstStyle/>
+          <a:p>
+            <a:r>
+              <a:rPr lang="en-CA" dirty="0">
+                <a:latin typeface="+mn-lt"/>
+              </a:rPr>
+              <a:t>A/B Testing: Test whether </a:t>
+            </a:r>
+            <a:r>
+              <a:rPr lang="en-CA" dirty="0" smtClean="0">
+                <a:latin typeface="+mn-lt"/>
+              </a:rPr>
+              <a:t>two samples of data come </a:t>
+            </a:r>
+            <a:r>
+              <a:rPr lang="en-CA" dirty="0">
+                <a:latin typeface="+mn-lt"/>
+              </a:rPr>
+              <a:t>from the same/different </a:t>
+            </a:r>
+            <a:r>
+              <a:rPr lang="en-CA" dirty="0" smtClean="0">
+                <a:latin typeface="+mn-lt"/>
+              </a:rPr>
+              <a:t>distribution</a:t>
+            </a:r>
+          </a:p>
+          <a:p>
+            <a:r>
+              <a:rPr lang="en-CA" dirty="0" smtClean="0">
+                <a:latin typeface="+mn-lt"/>
+              </a:rPr>
+              <a:t>TVD</a:t>
+            </a:r>
+            <a:r>
+              <a:rPr lang="en-CA" dirty="0">
+                <a:latin typeface="+mn-lt"/>
+              </a:rPr>
+              <a:t>: </a:t>
+            </a:r>
+            <a:r>
+              <a:rPr lang="en-CA" dirty="0" smtClean="0">
+                <a:latin typeface="+mn-lt"/>
+              </a:rPr>
+              <a:t>Compute distance between two </a:t>
+            </a:r>
+            <a:r>
+              <a:rPr lang="en-CA" dirty="0">
+                <a:latin typeface="+mn-lt"/>
+              </a:rPr>
+              <a:t>different </a:t>
+            </a:r>
+            <a:r>
+              <a:rPr lang="en-CA" dirty="0" smtClean="0">
+                <a:latin typeface="+mn-lt"/>
+              </a:rPr>
+              <a:t>samples from the </a:t>
+            </a:r>
+            <a:r>
+              <a:rPr lang="en-CA" smtClean="0">
+                <a:latin typeface="+mn-lt"/>
+              </a:rPr>
+              <a:t>same distribution</a:t>
+            </a:r>
+            <a:endParaRPr lang="en-CA" dirty="0" smtClean="0">
+              <a:latin typeface="+mn-lt"/>
+            </a:endParaRPr>
+          </a:p>
+        </p:txBody>
+      </p:sp>
+    </p:spTree>
+    <p:extLst>
+      <p:ext uri="{BB962C8B-B14F-4D97-AF65-F5344CB8AC3E}">
+        <p14:creationId xmlns:p14="http://schemas.microsoft.com/office/powerpoint/2010/main" val="1876369519"/>
+      </p:ext>
+    </p:extLst>
+  </p:cSld>
+  <p:clrMapOvr>
+    <a:masterClrMapping/>
+  </p:clrMapOvr>
+  <p:timing>
+    <p:tnLst>
+      <p:par>
+        <p:cTn id="1" dur="indefinite" restart="never" nodeType="tmRoot"/>
+      </p:par>
+    </p:tnLst>
+  </p:timing>
+</p:sld>
+</file>
+
+<file path=ppt/slides/slide9.xml><?xml version="1.0" encoding="utf-8"?>
+<p:sld xmlns:a="http://schemas.openxmlformats.org/drawingml/2006/main" xmlns:r="http://schemas.openxmlformats.org/officeDocument/2006/relationships" xmlns:p="http://schemas.openxmlformats.org/presentationml/2006/main">
+  <p:cSld>
+    <p:spTree>
+      <p:nvGrpSpPr>
+        <p:cNvPr id="1" name=""/>
+        <p:cNvGrpSpPr/>
+        <p:nvPr/>
+      </p:nvGrpSpPr>
+      <p:grpSpPr>
+        <a:xfrm>
+          <a:off x="0" y="0"/>
+          <a:ext cx="0" cy="0"/>
+          <a:chOff x="0" y="0"/>
+          <a:chExt cx="0" cy="0"/>
+        </a:xfrm>
+      </p:grpSpPr>
+      <p:sp>
+        <p:nvSpPr>
+          <p:cNvPr id="2" name="Title 1"/>
+          <p:cNvSpPr>
+            <a:spLocks noGrp="1"/>
+          </p:cNvSpPr>
+          <p:nvPr>
+            <p:ph type="title"/>
+          </p:nvPr>
+        </p:nvSpPr>
+        <p:spPr>
+          <a:xfrm>
+            <a:off x="457200" y="449932"/>
+            <a:ext cx="8286750" cy="1150353"/>
+          </a:xfrm>
+        </p:spPr>
+        <p:txBody>
+          <a:bodyPr/>
+          <a:lstStyle/>
+          <a:p>
+            <a:r>
+              <a:rPr lang="en-CA" dirty="0" smtClean="0">
+                <a:latin typeface="+mn-lt"/>
+              </a:rPr>
+              <a:t>Announcements</a:t>
+            </a:r>
+            <a:endParaRPr lang="en-CA" dirty="0">
+              <a:latin typeface="+mn-lt"/>
+            </a:endParaRPr>
+          </a:p>
+        </p:txBody>
+      </p:sp>
+      <p:sp>
+        <p:nvSpPr>
+          <p:cNvPr id="3" name="Content Placeholder 2"/>
+          <p:cNvSpPr>
+            <a:spLocks noGrp="1"/>
+          </p:cNvSpPr>
+          <p:nvPr>
+            <p:ph idx="1"/>
+          </p:nvPr>
+        </p:nvSpPr>
+        <p:spPr>
+          <a:xfrm>
+            <a:off x="457200" y="1756947"/>
+            <a:ext cx="8286750" cy="3596103"/>
+          </a:xfrm>
+        </p:spPr>
+        <p:txBody>
+          <a:bodyPr/>
+          <a:lstStyle/>
+          <a:p>
+            <a:r>
+              <a:rPr lang="en-CA" dirty="0">
+                <a:latin typeface="+mn-lt"/>
+              </a:rPr>
+              <a:t>Mid-Semester Feedback Form: </a:t>
+            </a:r>
+            <a:r>
+              <a:rPr lang="en-CA" dirty="0">
+                <a:latin typeface="+mn-lt"/>
+                <a:hlinkClick r:id="rId2"/>
+              </a:rPr>
+              <a:t>https://</a:t>
+            </a:r>
+            <a:r>
+              <a:rPr lang="en-CA" dirty="0" smtClean="0">
+                <a:latin typeface="+mn-lt"/>
+                <a:hlinkClick r:id="rId2"/>
+              </a:rPr>
+              <a:t>forms.gle/kUcX6VVCfyrbD7GEA</a:t>
+            </a:r>
+            <a:r>
+              <a:rPr lang="en-CA" dirty="0" smtClean="0">
+                <a:latin typeface="+mn-lt"/>
+              </a:rPr>
+              <a:t> (Please fill out by Sunday</a:t>
+            </a:r>
+            <a:r>
+              <a:rPr lang="en-CA" smtClean="0">
+                <a:latin typeface="+mn-lt"/>
+              </a:rPr>
+              <a:t>, October 27</a:t>
+            </a:r>
+            <a:r>
+              <a:rPr lang="en-CA" baseline="30000" smtClean="0">
+                <a:latin typeface="+mn-lt"/>
+              </a:rPr>
+              <a:t>th</a:t>
+            </a:r>
+            <a:r>
+              <a:rPr lang="en-CA" smtClean="0">
+                <a:latin typeface="+mn-lt"/>
+              </a:rPr>
+              <a:t>)</a:t>
+            </a:r>
+            <a:endParaRPr lang="en-CA" dirty="0" smtClean="0">
+              <a:latin typeface="+mn-lt"/>
+            </a:endParaRPr>
+          </a:p>
+          <a:p>
+            <a:r>
+              <a:rPr lang="en-CA" dirty="0" smtClean="0">
+                <a:latin typeface="+mn-lt"/>
+              </a:rPr>
+              <a:t>Lab 7 is brand new because of the power outage, so please be patient with any errors! </a:t>
+            </a:r>
+          </a:p>
+          <a:p>
+            <a:r>
+              <a:rPr lang="en-CA" dirty="0" smtClean="0">
+                <a:latin typeface="+mn-lt"/>
+              </a:rPr>
+              <a:t>Homework 8 is due next Thursday (10/31)</a:t>
+            </a:r>
+          </a:p>
+          <a:p>
+            <a:r>
+              <a:rPr lang="en-CA" dirty="0" smtClean="0">
+                <a:latin typeface="+mn-lt"/>
+              </a:rPr>
+              <a:t>Project 2: first checkpoint is due next Friday (11/1)</a:t>
+            </a:r>
+            <a:endParaRPr lang="en-CA" dirty="0">
+              <a:latin typeface="+mn-lt"/>
+            </a:endParaRPr>
+          </a:p>
+        </p:txBody>
+      </p:sp>
+    </p:spTree>
+    <p:extLst>
+      <p:ext uri="{BB962C8B-B14F-4D97-AF65-F5344CB8AC3E}">
+        <p14:creationId xmlns:p14="http://schemas.microsoft.com/office/powerpoint/2010/main" val="203414778"/>
       </p:ext>
     </p:extLst>
   </p:cSld>

</xml_diff>